<commit_message>
Update How to insert data using URL.pptx
</commit_message>
<xml_diff>
--- a/API_Presentation/How to insert data using URL.pptx
+++ b/API_Presentation/How to insert data using URL.pptx
@@ -12,6 +12,7 @@
     <p:sldId id="260" r:id="rId6"/>
     <p:sldId id="261" r:id="rId7"/>
     <p:sldId id="262" r:id="rId8"/>
+    <p:sldId id="263" r:id="rId9"/>
   </p:sldIdLst>
   <p:sldSz cx="12192000" cy="6858000"/>
   <p:notesSz cx="6858000" cy="9144000"/>
@@ -571,7 +572,7 @@
           <a:p>
             <a:fld id="{1583B0DF-3B89-42C5-98A8-136E8FC555F4}" type="datetimeFigureOut">
               <a:rPr lang="en-US" smtClean="0"/>
-              <a:t>12/7/2020</a:t>
+              <a:t>12/8/2020</a:t>
             </a:fld>
             <a:endParaRPr lang="en-US"/>
           </a:p>
@@ -903,7 +904,7 @@
           <a:p>
             <a:fld id="{1583B0DF-3B89-42C5-98A8-136E8FC555F4}" type="datetimeFigureOut">
               <a:rPr lang="en-US" smtClean="0"/>
-              <a:t>12/7/2020</a:t>
+              <a:t>12/8/2020</a:t>
             </a:fld>
             <a:endParaRPr lang="en-US"/>
           </a:p>
@@ -1099,7 +1100,7 @@
           <a:p>
             <a:fld id="{1583B0DF-3B89-42C5-98A8-136E8FC555F4}" type="datetimeFigureOut">
               <a:rPr lang="en-US" smtClean="0"/>
-              <a:t>12/7/2020</a:t>
+              <a:t>12/8/2020</a:t>
             </a:fld>
             <a:endParaRPr lang="en-US"/>
           </a:p>
@@ -1369,7 +1370,7 @@
           <a:p>
             <a:fld id="{1583B0DF-3B89-42C5-98A8-136E8FC555F4}" type="datetimeFigureOut">
               <a:rPr lang="en-US" smtClean="0"/>
-              <a:t>12/7/2020</a:t>
+              <a:t>12/8/2020</a:t>
             </a:fld>
             <a:endParaRPr lang="en-US"/>
           </a:p>
@@ -1797,7 +1798,7 @@
           <a:p>
             <a:fld id="{1583B0DF-3B89-42C5-98A8-136E8FC555F4}" type="datetimeFigureOut">
               <a:rPr lang="en-US" smtClean="0"/>
-              <a:t>12/7/2020</a:t>
+              <a:t>12/8/2020</a:t>
             </a:fld>
             <a:endParaRPr lang="en-US"/>
           </a:p>
@@ -2347,7 +2348,7 @@
           <a:p>
             <a:fld id="{1583B0DF-3B89-42C5-98A8-136E8FC555F4}" type="datetimeFigureOut">
               <a:rPr lang="en-US" smtClean="0"/>
-              <a:t>12/7/2020</a:t>
+              <a:t>12/8/2020</a:t>
             </a:fld>
             <a:endParaRPr lang="en-US"/>
           </a:p>
@@ -3137,7 +3138,7 @@
           <a:p>
             <a:fld id="{1583B0DF-3B89-42C5-98A8-136E8FC555F4}" type="datetimeFigureOut">
               <a:rPr lang="en-US" smtClean="0"/>
-              <a:t>12/7/2020</a:t>
+              <a:t>12/8/2020</a:t>
             </a:fld>
             <a:endParaRPr lang="en-US"/>
           </a:p>
@@ -3316,7 +3317,7 @@
           <a:p>
             <a:fld id="{1583B0DF-3B89-42C5-98A8-136E8FC555F4}" type="datetimeFigureOut">
               <a:rPr lang="en-US" smtClean="0"/>
-              <a:t>12/7/2020</a:t>
+              <a:t>12/8/2020</a:t>
             </a:fld>
             <a:endParaRPr lang="en-US"/>
           </a:p>
@@ -3500,7 +3501,7 @@
           <a:p>
             <a:fld id="{1583B0DF-3B89-42C5-98A8-136E8FC555F4}" type="datetimeFigureOut">
               <a:rPr lang="en-US" smtClean="0"/>
-              <a:t>12/7/2020</a:t>
+              <a:t>12/8/2020</a:t>
             </a:fld>
             <a:endParaRPr lang="en-US"/>
           </a:p>
@@ -3675,7 +3676,7 @@
           <a:p>
             <a:fld id="{1583B0DF-3B89-42C5-98A8-136E8FC555F4}" type="datetimeFigureOut">
               <a:rPr lang="en-US" smtClean="0"/>
-              <a:t>12/7/2020</a:t>
+              <a:t>12/8/2020</a:t>
             </a:fld>
             <a:endParaRPr lang="en-US"/>
           </a:p>
@@ -3925,7 +3926,7 @@
           <a:p>
             <a:fld id="{1583B0DF-3B89-42C5-98A8-136E8FC555F4}" type="datetimeFigureOut">
               <a:rPr lang="en-US" smtClean="0"/>
-              <a:t>12/7/2020</a:t>
+              <a:t>12/8/2020</a:t>
             </a:fld>
             <a:endParaRPr lang="en-US"/>
           </a:p>
@@ -4162,7 +4163,7 @@
           <a:p>
             <a:fld id="{1583B0DF-3B89-42C5-98A8-136E8FC555F4}" type="datetimeFigureOut">
               <a:rPr lang="en-US" smtClean="0"/>
-              <a:t>12/7/2020</a:t>
+              <a:t>12/8/2020</a:t>
             </a:fld>
             <a:endParaRPr lang="en-US"/>
           </a:p>
@@ -4547,7 +4548,7 @@
           <a:p>
             <a:fld id="{1583B0DF-3B89-42C5-98A8-136E8FC555F4}" type="datetimeFigureOut">
               <a:rPr lang="en-US" smtClean="0"/>
-              <a:t>12/7/2020</a:t>
+              <a:t>12/8/2020</a:t>
             </a:fld>
             <a:endParaRPr lang="en-US"/>
           </a:p>
@@ -4665,7 +4666,7 @@
           <a:p>
             <a:fld id="{1583B0DF-3B89-42C5-98A8-136E8FC555F4}" type="datetimeFigureOut">
               <a:rPr lang="en-US" smtClean="0"/>
-              <a:t>12/7/2020</a:t>
+              <a:t>12/8/2020</a:t>
             </a:fld>
             <a:endParaRPr lang="en-US"/>
           </a:p>
@@ -4760,7 +4761,7 @@
           <a:p>
             <a:fld id="{1583B0DF-3B89-42C5-98A8-136E8FC555F4}" type="datetimeFigureOut">
               <a:rPr lang="en-US" smtClean="0"/>
-              <a:t>12/7/2020</a:t>
+              <a:t>12/8/2020</a:t>
             </a:fld>
             <a:endParaRPr lang="en-US"/>
           </a:p>
@@ -5013,7 +5014,7 @@
           <a:p>
             <a:fld id="{1583B0DF-3B89-42C5-98A8-136E8FC555F4}" type="datetimeFigureOut">
               <a:rPr lang="en-US" smtClean="0"/>
-              <a:t>12/7/2020</a:t>
+              <a:t>12/8/2020</a:t>
             </a:fld>
             <a:endParaRPr lang="en-US"/>
           </a:p>
@@ -5282,7 +5283,7 @@
           <a:p>
             <a:fld id="{1583B0DF-3B89-42C5-98A8-136E8FC555F4}" type="datetimeFigureOut">
               <a:rPr lang="en-US" smtClean="0"/>
-              <a:t>12/7/2020</a:t>
+              <a:t>12/8/2020</a:t>
             </a:fld>
             <a:endParaRPr lang="en-US"/>
           </a:p>
@@ -5685,7 +5686,7 @@
           <a:p>
             <a:fld id="{1583B0DF-3B89-42C5-98A8-136E8FC555F4}" type="datetimeFigureOut">
               <a:rPr lang="en-US" smtClean="0"/>
-              <a:t>12/7/2020</a:t>
+              <a:t>12/8/2020</a:t>
             </a:fld>
             <a:endParaRPr lang="en-US"/>
           </a:p>
@@ -8946,6 +8947,401 @@
 </p:sld>
 </file>
 
+<file path=ppt/slides/slide8.xml><?xml version="1.0" encoding="utf-8"?>
+<p:sld xmlns:a="http://schemas.openxmlformats.org/drawingml/2006/main" xmlns:r="http://schemas.openxmlformats.org/officeDocument/2006/relationships" xmlns:p="http://schemas.openxmlformats.org/presentationml/2006/main">
+  <p:cSld>
+    <p:spTree>
+      <p:nvGrpSpPr>
+        <p:cNvPr id="1" name=""/>
+        <p:cNvGrpSpPr/>
+        <p:nvPr/>
+      </p:nvGrpSpPr>
+      <p:grpSpPr>
+        <a:xfrm>
+          <a:off x="0" y="0"/>
+          <a:ext cx="0" cy="0"/>
+          <a:chOff x="0" y="0"/>
+          <a:chExt cx="0" cy="0"/>
+        </a:xfrm>
+      </p:grpSpPr>
+      <p:sp>
+        <p:nvSpPr>
+          <p:cNvPr id="2" name="Title 1">
+            <a:extLst>
+              <a:ext uri="{FF2B5EF4-FFF2-40B4-BE49-F238E27FC236}">
+                <a16:creationId xmlns:a16="http://schemas.microsoft.com/office/drawing/2014/main" id="{4E4DC630-3226-40B4-8CAA-80183674729D}"/>
+              </a:ext>
+            </a:extLst>
+          </p:cNvPr>
+          <p:cNvSpPr>
+            <a:spLocks noGrp="1"/>
+          </p:cNvSpPr>
+          <p:nvPr>
+            <p:ph type="title"/>
+          </p:nvPr>
+        </p:nvSpPr>
+        <p:spPr>
+          <a:xfrm>
+            <a:off x="792333" y="2132860"/>
+            <a:ext cx="10396882" cy="1151965"/>
+          </a:xfrm>
+        </p:spPr>
+        <p:txBody>
+          <a:bodyPr>
+            <a:normAutofit/>
+          </a:bodyPr>
+          <a:lstStyle/>
+          <a:p>
+            <a:pPr algn="ctr"/>
+            <a:r>
+              <a:rPr lang="en-US" dirty="0"/>
+              <a:t>Thank You</a:t>
+            </a:r>
+          </a:p>
+        </p:txBody>
+      </p:sp>
+    </p:spTree>
+    <p:extLst>
+      <p:ext uri="{BB962C8B-B14F-4D97-AF65-F5344CB8AC3E}">
+        <p14:creationId xmlns:p14="http://schemas.microsoft.com/office/powerpoint/2010/main" val="3422294891"/>
+      </p:ext>
+    </p:extLst>
+  </p:cSld>
+  <p:clrMapOvr>
+    <a:masterClrMapping/>
+  </p:clrMapOvr>
+  <p:timing>
+    <p:tnLst>
+      <p:par>
+        <p:cTn id="1" dur="indefinite" restart="never" nodeType="tmRoot">
+          <p:childTnLst>
+            <p:seq concurrent="1" nextAc="seek">
+              <p:cTn id="2" dur="indefinite" nodeType="mainSeq">
+                <p:childTnLst>
+                  <p:par>
+                    <p:cTn id="3" fill="hold">
+                      <p:stCondLst>
+                        <p:cond delay="indefinite"/>
+                      </p:stCondLst>
+                      <p:childTnLst>
+                        <p:par>
+                          <p:cTn id="4" fill="hold">
+                            <p:stCondLst>
+                              <p:cond delay="0"/>
+                            </p:stCondLst>
+                            <p:childTnLst>
+                              <p:par>
+                                <p:cTn id="5" presetID="26" presetClass="entr" presetSubtype="0" fill="hold" grpId="0" nodeType="clickEffect">
+                                  <p:stCondLst>
+                                    <p:cond delay="0"/>
+                                  </p:stCondLst>
+                                  <p:childTnLst>
+                                    <p:set>
+                                      <p:cBhvr>
+                                        <p:cTn id="6" dur="1" fill="hold">
+                                          <p:stCondLst>
+                                            <p:cond delay="0"/>
+                                          </p:stCondLst>
+                                        </p:cTn>
+                                        <p:tgtEl>
+                                          <p:spTgt spid="2"/>
+                                        </p:tgtEl>
+                                        <p:attrNameLst>
+                                          <p:attrName>style.visibility</p:attrName>
+                                        </p:attrNameLst>
+                                      </p:cBhvr>
+                                      <p:to>
+                                        <p:strVal val="visible"/>
+                                      </p:to>
+                                    </p:set>
+                                    <p:animEffect transition="in" filter="wipe(down)">
+                                      <p:cBhvr>
+                                        <p:cTn id="7" dur="580">
+                                          <p:stCondLst>
+                                            <p:cond delay="0"/>
+                                          </p:stCondLst>
+                                        </p:cTn>
+                                        <p:tgtEl>
+                                          <p:spTgt spid="2"/>
+                                        </p:tgtEl>
+                                      </p:cBhvr>
+                                    </p:animEffect>
+                                    <p:anim calcmode="lin" valueType="num">
+                                      <p:cBhvr>
+                                        <p:cTn id="8" dur="1822" tmFilter="0,0; 0.14,0.36; 0.43,0.73; 0.71,0.91; 1.0,1.0">
+                                          <p:stCondLst>
+                                            <p:cond delay="0"/>
+                                          </p:stCondLst>
+                                        </p:cTn>
+                                        <p:tgtEl>
+                                          <p:spTgt spid="2"/>
+                                        </p:tgtEl>
+                                        <p:attrNameLst>
+                                          <p:attrName>ppt_x</p:attrName>
+                                        </p:attrNameLst>
+                                      </p:cBhvr>
+                                      <p:tavLst>
+                                        <p:tav tm="0">
+                                          <p:val>
+                                            <p:strVal val="#ppt_x-0.25"/>
+                                          </p:val>
+                                        </p:tav>
+                                        <p:tav tm="100000">
+                                          <p:val>
+                                            <p:strVal val="#ppt_x"/>
+                                          </p:val>
+                                        </p:tav>
+                                      </p:tavLst>
+                                    </p:anim>
+                                    <p:anim calcmode="lin" valueType="num">
+                                      <p:cBhvr>
+                                        <p:cTn id="9" dur="664" tmFilter="0.0,0.0; 0.25,0.07; 0.50,0.2; 0.75,0.467; 1.0,1.0">
+                                          <p:stCondLst>
+                                            <p:cond delay="0"/>
+                                          </p:stCondLst>
+                                        </p:cTn>
+                                        <p:tgtEl>
+                                          <p:spTgt spid="2"/>
+                                        </p:tgtEl>
+                                        <p:attrNameLst>
+                                          <p:attrName>ppt_y</p:attrName>
+                                        </p:attrNameLst>
+                                      </p:cBhvr>
+                                      <p:tavLst>
+                                        <p:tav tm="0" fmla="#ppt_y-sin(pi*$)/3">
+                                          <p:val>
+                                            <p:fltVal val="0.5"/>
+                                          </p:val>
+                                        </p:tav>
+                                        <p:tav tm="100000">
+                                          <p:val>
+                                            <p:fltVal val="1"/>
+                                          </p:val>
+                                        </p:tav>
+                                      </p:tavLst>
+                                    </p:anim>
+                                    <p:anim calcmode="lin" valueType="num">
+                                      <p:cBhvr>
+                                        <p:cTn id="10" dur="664" tmFilter="0, 0; 0.125,0.2665; 0.25,0.4; 0.375,0.465; 0.5,0.5;  0.625,0.535; 0.75,0.6; 0.875,0.7335; 1,1">
+                                          <p:stCondLst>
+                                            <p:cond delay="664"/>
+                                          </p:stCondLst>
+                                        </p:cTn>
+                                        <p:tgtEl>
+                                          <p:spTgt spid="2"/>
+                                        </p:tgtEl>
+                                        <p:attrNameLst>
+                                          <p:attrName>ppt_y</p:attrName>
+                                        </p:attrNameLst>
+                                      </p:cBhvr>
+                                      <p:tavLst>
+                                        <p:tav tm="0" fmla="#ppt_y-sin(pi*$)/9">
+                                          <p:val>
+                                            <p:fltVal val="0"/>
+                                          </p:val>
+                                        </p:tav>
+                                        <p:tav tm="100000">
+                                          <p:val>
+                                            <p:fltVal val="1"/>
+                                          </p:val>
+                                        </p:tav>
+                                      </p:tavLst>
+                                    </p:anim>
+                                    <p:anim calcmode="lin" valueType="num">
+                                      <p:cBhvr>
+                                        <p:cTn id="11" dur="332" tmFilter="0, 0; 0.125,0.2665; 0.25,0.4; 0.375,0.465; 0.5,0.5;  0.625,0.535; 0.75,0.6; 0.875,0.7335; 1,1">
+                                          <p:stCondLst>
+                                            <p:cond delay="1324"/>
+                                          </p:stCondLst>
+                                        </p:cTn>
+                                        <p:tgtEl>
+                                          <p:spTgt spid="2"/>
+                                        </p:tgtEl>
+                                        <p:attrNameLst>
+                                          <p:attrName>ppt_y</p:attrName>
+                                        </p:attrNameLst>
+                                      </p:cBhvr>
+                                      <p:tavLst>
+                                        <p:tav tm="0" fmla="#ppt_y-sin(pi*$)/27">
+                                          <p:val>
+                                            <p:fltVal val="0"/>
+                                          </p:val>
+                                        </p:tav>
+                                        <p:tav tm="100000">
+                                          <p:val>
+                                            <p:fltVal val="1"/>
+                                          </p:val>
+                                        </p:tav>
+                                      </p:tavLst>
+                                    </p:anim>
+                                    <p:anim calcmode="lin" valueType="num">
+                                      <p:cBhvr>
+                                        <p:cTn id="12" dur="164" tmFilter="0, 0; 0.125,0.2665; 0.25,0.4; 0.375,0.465; 0.5,0.5;  0.625,0.535; 0.75,0.6; 0.875,0.7335; 1,1">
+                                          <p:stCondLst>
+                                            <p:cond delay="1656"/>
+                                          </p:stCondLst>
+                                        </p:cTn>
+                                        <p:tgtEl>
+                                          <p:spTgt spid="2"/>
+                                        </p:tgtEl>
+                                        <p:attrNameLst>
+                                          <p:attrName>ppt_y</p:attrName>
+                                        </p:attrNameLst>
+                                      </p:cBhvr>
+                                      <p:tavLst>
+                                        <p:tav tm="0" fmla="#ppt_y-sin(pi*$)/81">
+                                          <p:val>
+                                            <p:fltVal val="0"/>
+                                          </p:val>
+                                        </p:tav>
+                                        <p:tav tm="100000">
+                                          <p:val>
+                                            <p:fltVal val="1"/>
+                                          </p:val>
+                                        </p:tav>
+                                      </p:tavLst>
+                                    </p:anim>
+                                    <p:animScale>
+                                      <p:cBhvr>
+                                        <p:cTn id="13" dur="26">
+                                          <p:stCondLst>
+                                            <p:cond delay="650"/>
+                                          </p:stCondLst>
+                                        </p:cTn>
+                                        <p:tgtEl>
+                                          <p:spTgt spid="2"/>
+                                        </p:tgtEl>
+                                      </p:cBhvr>
+                                      <p:to x="100000" y="60000"/>
+                                    </p:animScale>
+                                    <p:animScale>
+                                      <p:cBhvr>
+                                        <p:cTn id="14" dur="166" decel="50000">
+                                          <p:stCondLst>
+                                            <p:cond delay="676"/>
+                                          </p:stCondLst>
+                                        </p:cTn>
+                                        <p:tgtEl>
+                                          <p:spTgt spid="2"/>
+                                        </p:tgtEl>
+                                      </p:cBhvr>
+                                      <p:to x="100000" y="100000"/>
+                                    </p:animScale>
+                                    <p:animScale>
+                                      <p:cBhvr>
+                                        <p:cTn id="15" dur="26">
+                                          <p:stCondLst>
+                                            <p:cond delay="1312"/>
+                                          </p:stCondLst>
+                                        </p:cTn>
+                                        <p:tgtEl>
+                                          <p:spTgt spid="2"/>
+                                        </p:tgtEl>
+                                      </p:cBhvr>
+                                      <p:to x="100000" y="80000"/>
+                                    </p:animScale>
+                                    <p:animScale>
+                                      <p:cBhvr>
+                                        <p:cTn id="16" dur="166" decel="50000">
+                                          <p:stCondLst>
+                                            <p:cond delay="1338"/>
+                                          </p:stCondLst>
+                                        </p:cTn>
+                                        <p:tgtEl>
+                                          <p:spTgt spid="2"/>
+                                        </p:tgtEl>
+                                      </p:cBhvr>
+                                      <p:to x="100000" y="100000"/>
+                                    </p:animScale>
+                                    <p:animScale>
+                                      <p:cBhvr>
+                                        <p:cTn id="17" dur="26">
+                                          <p:stCondLst>
+                                            <p:cond delay="1642"/>
+                                          </p:stCondLst>
+                                        </p:cTn>
+                                        <p:tgtEl>
+                                          <p:spTgt spid="2"/>
+                                        </p:tgtEl>
+                                      </p:cBhvr>
+                                      <p:to x="100000" y="90000"/>
+                                    </p:animScale>
+                                    <p:animScale>
+                                      <p:cBhvr>
+                                        <p:cTn id="18" dur="166" decel="50000">
+                                          <p:stCondLst>
+                                            <p:cond delay="1668"/>
+                                          </p:stCondLst>
+                                        </p:cTn>
+                                        <p:tgtEl>
+                                          <p:spTgt spid="2"/>
+                                        </p:tgtEl>
+                                      </p:cBhvr>
+                                      <p:to x="100000" y="100000"/>
+                                    </p:animScale>
+                                    <p:animScale>
+                                      <p:cBhvr>
+                                        <p:cTn id="19" dur="26">
+                                          <p:stCondLst>
+                                            <p:cond delay="1808"/>
+                                          </p:stCondLst>
+                                        </p:cTn>
+                                        <p:tgtEl>
+                                          <p:spTgt spid="2"/>
+                                        </p:tgtEl>
+                                      </p:cBhvr>
+                                      <p:to x="100000" y="95000"/>
+                                    </p:animScale>
+                                    <p:animScale>
+                                      <p:cBhvr>
+                                        <p:cTn id="20" dur="166" decel="50000">
+                                          <p:stCondLst>
+                                            <p:cond delay="1834"/>
+                                          </p:stCondLst>
+                                        </p:cTn>
+                                        <p:tgtEl>
+                                          <p:spTgt spid="2"/>
+                                        </p:tgtEl>
+                                      </p:cBhvr>
+                                      <p:to x="100000" y="100000"/>
+                                    </p:animScale>
+                                  </p:childTnLst>
+                                </p:cTn>
+                              </p:par>
+                            </p:childTnLst>
+                          </p:cTn>
+                        </p:par>
+                      </p:childTnLst>
+                    </p:cTn>
+                  </p:par>
+                </p:childTnLst>
+              </p:cTn>
+              <p:prevCondLst>
+                <p:cond evt="onPrev" delay="0">
+                  <p:tgtEl>
+                    <p:sldTgt/>
+                  </p:tgtEl>
+                </p:cond>
+              </p:prevCondLst>
+              <p:nextCondLst>
+                <p:cond evt="onNext" delay="0">
+                  <p:tgtEl>
+                    <p:sldTgt/>
+                  </p:tgtEl>
+                </p:cond>
+              </p:nextCondLst>
+            </p:seq>
+          </p:childTnLst>
+        </p:cTn>
+      </p:par>
+    </p:tnLst>
+    <p:bldLst>
+      <p:bldP spid="2" grpId="0"/>
+    </p:bldLst>
+  </p:timing>
+</p:sld>
+</file>
+
 <file path=ppt/theme/theme1.xml><?xml version="1.0" encoding="utf-8"?>
 <a:theme xmlns:a="http://schemas.openxmlformats.org/drawingml/2006/main" name="Main Event">
   <a:themeElements>

</xml_diff>